<commit_message>
Update ppt rev 15
</commit_message>
<xml_diff>
--- a/presentation/Booksville Presentation.pptx
+++ b/presentation/Booksville Presentation.pptx
@@ -6813,7 +6813,7 @@
             <a:rPr lang="en-US" sz="2000" dirty="0">
               <a:latin typeface="Copperplate Gothic Light" panose="020E0507020206020404" pitchFamily="34" charset="0"/>
             </a:rPr>
-            <a:t>It is possible to predict sale price of a book with a high degree of accuracy if healthy sale history or affiliate sale history is available</a:t>
+            <a:t>It is possible to predict sale price of a book with a high degree of accuracy if healthy sale history is available</a:t>
           </a:r>
         </a:p>
       </dgm:t>
@@ -6891,7 +6891,7 @@
             <a:rPr lang="en-US" sz="2000" dirty="0">
               <a:latin typeface="Copperplate Gothic Light" panose="020E0507020206020404" pitchFamily="34" charset="0"/>
             </a:rPr>
-            <a:t>While we have been able to take a sneak peek at Amazon’s pricing model, there is still some magic waiting to be uncovered.</a:t>
+            <a:t>Amazon genius is in how they capture a multitude of sale points into a set of statistical features.</a:t>
           </a:r>
         </a:p>
       </dgm:t>
@@ -6899,10 +6899,24 @@
     <dgm:pt modelId="{13436E20-9C35-491A-9505-A21C78B5D994}" type="parTrans" cxnId="{9AFAF1D4-D5A7-4E85-8D45-962D37EBA5F8}">
       <dgm:prSet/>
       <dgm:spPr/>
+      <dgm:t>
+        <a:bodyPr/>
+        <a:lstStyle/>
+        <a:p>
+          <a:endParaRPr lang="en-US"/>
+        </a:p>
+      </dgm:t>
     </dgm:pt>
     <dgm:pt modelId="{1DDCFB4D-44B2-41DD-9087-640B23D67EAD}" type="sibTrans" cxnId="{9AFAF1D4-D5A7-4E85-8D45-962D37EBA5F8}">
       <dgm:prSet/>
       <dgm:spPr/>
+      <dgm:t>
+        <a:bodyPr/>
+        <a:lstStyle/>
+        <a:p>
+          <a:endParaRPr lang="en-US"/>
+        </a:p>
+      </dgm:t>
     </dgm:pt>
     <dgm:pt modelId="{70BAABBD-17F8-4194-B3F4-6B8001BD0C3C}" type="pres">
       <dgm:prSet presAssocID="{27057191-ABB3-4324-875B-128343672CEB}" presName="vert0" presStyleCnt="0">
@@ -9860,7 +9874,7 @@
             <a:rPr lang="en-US" sz="2000" kern="1200" dirty="0">
               <a:latin typeface="Copperplate Gothic Light" panose="020E0507020206020404" pitchFamily="34" charset="0"/>
             </a:rPr>
-            <a:t>It is possible to predict sale price of a book with a high degree of accuracy if healthy sale history or affiliate sale history is available</a:t>
+            <a:t>It is possible to predict sale price of a book with a high degree of accuracy if healthy sale history is available</a:t>
           </a:r>
         </a:p>
       </dsp:txBody>
@@ -10128,7 +10142,7 @@
             <a:rPr lang="en-US" sz="2000" kern="1200" dirty="0">
               <a:latin typeface="Copperplate Gothic Light" panose="020E0507020206020404" pitchFamily="34" charset="0"/>
             </a:rPr>
-            <a:t>While we have been able to take a sneak peek at Amazon’s pricing model, there is still some magic waiting to be uncovered.</a:t>
+            <a:t>Amazon genius is in how they capture a multitude of sale points into a set of statistical features.</a:t>
           </a:r>
         </a:p>
       </dsp:txBody>
@@ -17862,7 +17876,7 @@
           <a:p>
             <a:fld id="{4AAD347D-5ACD-4C99-B74B-A9C85AD731AF}" type="datetimeFigureOut">
               <a:rPr lang="en-US" dirty="0"/>
-              <a:t>6/13/2019</a:t>
+              <a:t>6/14/2019</a:t>
             </a:fld>
             <a:endParaRPr lang="en-US" dirty="0"/>
           </a:p>
@@ -18132,7 +18146,7 @@
           <a:p>
             <a:fld id="{4509A250-FF31-4206-8172-F9D3106AACB1}" type="datetimeFigureOut">
               <a:rPr lang="en-US" dirty="0"/>
-              <a:t>6/13/2019</a:t>
+              <a:t>6/14/2019</a:t>
             </a:fld>
             <a:endParaRPr lang="en-US" dirty="0"/>
           </a:p>
@@ -18321,7 +18335,7 @@
           <a:p>
             <a:fld id="{4509A250-FF31-4206-8172-F9D3106AACB1}" type="datetimeFigureOut">
               <a:rPr lang="en-US" dirty="0"/>
-              <a:t>6/13/2019</a:t>
+              <a:t>6/14/2019</a:t>
             </a:fld>
             <a:endParaRPr lang="en-US" dirty="0"/>
           </a:p>
@@ -18589,7 +18603,7 @@
           <a:p>
             <a:fld id="{4509A250-FF31-4206-8172-F9D3106AACB1}" type="datetimeFigureOut">
               <a:rPr lang="en-US" dirty="0"/>
-              <a:t>6/13/2019</a:t>
+              <a:t>6/14/2019</a:t>
             </a:fld>
             <a:endParaRPr lang="en-US" dirty="0"/>
           </a:p>
@@ -18925,7 +18939,7 @@
           <a:p>
             <a:fld id="{4509A250-FF31-4206-8172-F9D3106AACB1}" type="datetimeFigureOut">
               <a:rPr lang="en-US" dirty="0"/>
-              <a:t>6/13/2019</a:t>
+              <a:t>6/14/2019</a:t>
             </a:fld>
             <a:endParaRPr lang="en-US" dirty="0"/>
           </a:p>
@@ -19543,7 +19557,7 @@
           <a:p>
             <a:fld id="{4509A250-FF31-4206-8172-F9D3106AACB1}" type="datetimeFigureOut">
               <a:rPr lang="en-US" dirty="0"/>
-              <a:t>6/13/2019</a:t>
+              <a:t>6/14/2019</a:t>
             </a:fld>
             <a:endParaRPr lang="en-US" dirty="0"/>
           </a:p>
@@ -20398,7 +20412,7 @@
           <a:p>
             <a:fld id="{4509A250-FF31-4206-8172-F9D3106AACB1}" type="datetimeFigureOut">
               <a:rPr lang="en-US" dirty="0"/>
-              <a:t>6/13/2019</a:t>
+              <a:t>6/14/2019</a:t>
             </a:fld>
             <a:endParaRPr lang="en-US" dirty="0"/>
           </a:p>
@@ -20563,7 +20577,7 @@
           <a:p>
             <a:fld id="{4509A250-FF31-4206-8172-F9D3106AACB1}" type="datetimeFigureOut">
               <a:rPr lang="en-US" dirty="0"/>
-              <a:t>6/13/2019</a:t>
+              <a:t>6/14/2019</a:t>
             </a:fld>
             <a:endParaRPr lang="en-US" dirty="0"/>
           </a:p>
@@ -20738,7 +20752,7 @@
           <a:p>
             <a:fld id="{4509A250-FF31-4206-8172-F9D3106AACB1}" type="datetimeFigureOut">
               <a:rPr lang="en-US" dirty="0"/>
-              <a:t>6/13/2019</a:t>
+              <a:t>6/14/2019</a:t>
             </a:fld>
             <a:endParaRPr lang="en-US" dirty="0"/>
           </a:p>
@@ -20903,7 +20917,7 @@
           <a:p>
             <a:fld id="{4509A250-FF31-4206-8172-F9D3106AACB1}" type="datetimeFigureOut">
               <a:rPr lang="en-US" dirty="0"/>
-              <a:t>6/13/2019</a:t>
+              <a:t>6/14/2019</a:t>
             </a:fld>
             <a:endParaRPr lang="en-US" dirty="0"/>
           </a:p>
@@ -21145,7 +21159,7 @@
           <a:p>
             <a:fld id="{9796027F-7875-4030-9381-8BD8C4F21935}" type="datetimeFigureOut">
               <a:rPr lang="en-US" dirty="0"/>
-              <a:t>6/13/2019</a:t>
+              <a:t>6/14/2019</a:t>
             </a:fld>
             <a:endParaRPr lang="en-US" dirty="0"/>
           </a:p>
@@ -21432,7 +21446,7 @@
           <a:p>
             <a:fld id="{9796027F-7875-4030-9381-8BD8C4F21935}" type="datetimeFigureOut">
               <a:rPr lang="en-US" dirty="0"/>
-              <a:t>6/13/2019</a:t>
+              <a:t>6/14/2019</a:t>
             </a:fld>
             <a:endParaRPr lang="en-US" dirty="0"/>
           </a:p>
@@ -21871,7 +21885,7 @@
           <a:p>
             <a:fld id="{9796027F-7875-4030-9381-8BD8C4F21935}" type="datetimeFigureOut">
               <a:rPr lang="en-US" dirty="0"/>
-              <a:t>6/13/2019</a:t>
+              <a:t>6/14/2019</a:t>
             </a:fld>
             <a:endParaRPr lang="en-US" dirty="0"/>
           </a:p>
@@ -21984,7 +21998,7 @@
           <a:p>
             <a:fld id="{4509A250-FF31-4206-8172-F9D3106AACB1}" type="datetimeFigureOut">
               <a:rPr lang="en-US" dirty="0"/>
-              <a:t>6/13/2019</a:t>
+              <a:t>6/14/2019</a:t>
             </a:fld>
             <a:endParaRPr lang="en-US" dirty="0"/>
           </a:p>
@@ -22074,7 +22088,7 @@
           <a:p>
             <a:fld id="{4509A250-FF31-4206-8172-F9D3106AACB1}" type="datetimeFigureOut">
               <a:rPr lang="en-US" dirty="0"/>
-              <a:t>6/13/2019</a:t>
+              <a:t>6/14/2019</a:t>
             </a:fld>
             <a:endParaRPr lang="en-US" dirty="0"/>
           </a:p>
@@ -22348,7 +22362,7 @@
           <a:p>
             <a:fld id="{4509A250-FF31-4206-8172-F9D3106AACB1}" type="datetimeFigureOut">
               <a:rPr lang="en-US" dirty="0"/>
-              <a:t>6/13/2019</a:t>
+              <a:t>6/14/2019</a:t>
             </a:fld>
             <a:endParaRPr lang="en-US" dirty="0"/>
           </a:p>
@@ -22618,7 +22632,7 @@
           <a:p>
             <a:fld id="{4509A250-FF31-4206-8172-F9D3106AACB1}" type="datetimeFigureOut">
               <a:rPr lang="en-US" dirty="0"/>
-              <a:t>6/13/2019</a:t>
+              <a:t>6/14/2019</a:t>
             </a:fld>
             <a:endParaRPr lang="en-US" dirty="0"/>
           </a:p>
@@ -23042,7 +23056,7 @@
           <a:p>
             <a:fld id="{4AAD347D-5ACD-4C99-B74B-A9C85AD731AF}" type="datetimeFigureOut">
               <a:rPr lang="en-US" dirty="0"/>
-              <a:t>6/13/2019</a:t>
+              <a:t>6/14/2019</a:t>
             </a:fld>
             <a:endParaRPr lang="en-US" dirty="0"/>
           </a:p>
@@ -32950,7 +32964,7 @@
             <p:ph idx="1"/>
             <p:extLst>
               <p:ext uri="{D42A27DB-BD31-4B8C-83A1-F6EECF244321}">
-                <p14:modId xmlns:p14="http://schemas.microsoft.com/office/powerpoint/2010/main" val="3606469291"/>
+                <p14:modId xmlns:p14="http://schemas.microsoft.com/office/powerpoint/2010/main" val="2708599203"/>
               </p:ext>
             </p:extLst>
           </p:nvPr>

</xml_diff>

<commit_message>
update ppt rev 16
</commit_message>
<xml_diff>
--- a/presentation/Booksville Presentation.pptx
+++ b/presentation/Booksville Presentation.pptx
@@ -25071,7 +25071,7 @@
               <a:buChar char=""/>
             </a:pPr>
             <a:r>
-              <a:rPr lang="en-US" dirty="0">
+              <a:rPr lang="en-US" b="1" dirty="0">
                 <a:latin typeface="Copperplate Gothic Light" panose="020E0507020206020404" pitchFamily="34" charset="0"/>
                 <a:ea typeface="+mj-ea"/>
                 <a:cs typeface="+mj-cs"/>
@@ -39185,7 +39185,7 @@
               <a:buNone/>
             </a:pPr>
             <a:r>
-              <a:rPr lang="en-US" sz="1800" cap="all">
+              <a:rPr lang="en-US" sz="1800" cap="all" dirty="0">
                 <a:solidFill>
                   <a:schemeClr val="tx2">
                     <a:lumMod val="40000"/>
@@ -39193,7 +39193,7 @@
                   </a:schemeClr>
                 </a:solidFill>
               </a:rPr>
-              <a:t>Predict future sale price of a book based on historic Amazon sale data</a:t>
+              <a:t>Can we Predict future sale price of a book based on historic Amazon sale data?</a:t>
             </a:r>
           </a:p>
         </p:txBody>

</xml_diff>